<commit_message>
Update Undo / Redo DG
</commit_message>
<xml_diff>
--- a/docs/diagrams/UndoRedoNewCommand1StateListDiagram.pptx
+++ b/docs/diagrams/UndoRedoNewCommand1StateListDiagram.pptx
@@ -112,10 +112,6 @@
 </p:presentation>
 </file>
 
-<file path=ppt/revisionInfo.xml><?xml version="1.0" encoding="utf-8"?>
-<p1510:revInfo xmlns:a="http://schemas.openxmlformats.org/drawingml/2006/main" xmlns:r="http://schemas.openxmlformats.org/officeDocument/2006/relationships" xmlns:p1510="http://schemas.microsoft.com/office/powerpoint/2015/10/main"/>
-</file>
-
 <file path=ppt/slideLayouts/slideLayout1.xml><?xml version="1.0" encoding="utf-8"?>
 <p:sldLayout xmlns:a="http://schemas.openxmlformats.org/drawingml/2006/main" xmlns:r="http://schemas.openxmlformats.org/officeDocument/2006/relationships" xmlns:p="http://schemas.openxmlformats.org/presentationml/2006/main" type="title" preserve="1">
   <p:cSld name="Title Slide">
@@ -265,7 +261,7 @@
           <a:p>
             <a:fld id="{03EC4E3E-8101-482F-A883-8B55DAFF7C07}" type="datetimeFigureOut">
               <a:rPr lang="en-SG" smtClean="0"/>
-              <a:t>6/7/2018</a:t>
+              <a:t>15/4/2019</a:t>
             </a:fld>
             <a:endParaRPr lang="en-SG"/>
           </a:p>
@@ -465,7 +461,7 @@
           <a:p>
             <a:fld id="{03EC4E3E-8101-482F-A883-8B55DAFF7C07}" type="datetimeFigureOut">
               <a:rPr lang="en-SG" smtClean="0"/>
-              <a:t>6/7/2018</a:t>
+              <a:t>15/4/2019</a:t>
             </a:fld>
             <a:endParaRPr lang="en-SG"/>
           </a:p>
@@ -675,7 +671,7 @@
           <a:p>
             <a:fld id="{03EC4E3E-8101-482F-A883-8B55DAFF7C07}" type="datetimeFigureOut">
               <a:rPr lang="en-SG" smtClean="0"/>
-              <a:t>6/7/2018</a:t>
+              <a:t>15/4/2019</a:t>
             </a:fld>
             <a:endParaRPr lang="en-SG"/>
           </a:p>
@@ -875,7 +871,7 @@
           <a:p>
             <a:fld id="{03EC4E3E-8101-482F-A883-8B55DAFF7C07}" type="datetimeFigureOut">
               <a:rPr lang="en-SG" smtClean="0"/>
-              <a:t>6/7/2018</a:t>
+              <a:t>15/4/2019</a:t>
             </a:fld>
             <a:endParaRPr lang="en-SG"/>
           </a:p>
@@ -1151,7 +1147,7 @@
           <a:p>
             <a:fld id="{03EC4E3E-8101-482F-A883-8B55DAFF7C07}" type="datetimeFigureOut">
               <a:rPr lang="en-SG" smtClean="0"/>
-              <a:t>6/7/2018</a:t>
+              <a:t>15/4/2019</a:t>
             </a:fld>
             <a:endParaRPr lang="en-SG"/>
           </a:p>
@@ -1419,7 +1415,7 @@
           <a:p>
             <a:fld id="{03EC4E3E-8101-482F-A883-8B55DAFF7C07}" type="datetimeFigureOut">
               <a:rPr lang="en-SG" smtClean="0"/>
-              <a:t>6/7/2018</a:t>
+              <a:t>15/4/2019</a:t>
             </a:fld>
             <a:endParaRPr lang="en-SG"/>
           </a:p>
@@ -1834,7 +1830,7 @@
           <a:p>
             <a:fld id="{03EC4E3E-8101-482F-A883-8B55DAFF7C07}" type="datetimeFigureOut">
               <a:rPr lang="en-SG" smtClean="0"/>
-              <a:t>6/7/2018</a:t>
+              <a:t>15/4/2019</a:t>
             </a:fld>
             <a:endParaRPr lang="en-SG"/>
           </a:p>
@@ -1976,7 +1972,7 @@
           <a:p>
             <a:fld id="{03EC4E3E-8101-482F-A883-8B55DAFF7C07}" type="datetimeFigureOut">
               <a:rPr lang="en-SG" smtClean="0"/>
-              <a:t>6/7/2018</a:t>
+              <a:t>15/4/2019</a:t>
             </a:fld>
             <a:endParaRPr lang="en-SG"/>
           </a:p>
@@ -2089,7 +2085,7 @@
           <a:p>
             <a:fld id="{03EC4E3E-8101-482F-A883-8B55DAFF7C07}" type="datetimeFigureOut">
               <a:rPr lang="en-SG" smtClean="0"/>
-              <a:t>6/7/2018</a:t>
+              <a:t>15/4/2019</a:t>
             </a:fld>
             <a:endParaRPr lang="en-SG"/>
           </a:p>
@@ -2402,7 +2398,7 @@
           <a:p>
             <a:fld id="{03EC4E3E-8101-482F-A883-8B55DAFF7C07}" type="datetimeFigureOut">
               <a:rPr lang="en-SG" smtClean="0"/>
-              <a:t>6/7/2018</a:t>
+              <a:t>15/4/2019</a:t>
             </a:fld>
             <a:endParaRPr lang="en-SG"/>
           </a:p>
@@ -2691,7 +2687,7 @@
           <a:p>
             <a:fld id="{03EC4E3E-8101-482F-A883-8B55DAFF7C07}" type="datetimeFigureOut">
               <a:rPr lang="en-SG" smtClean="0"/>
-              <a:t>6/7/2018</a:t>
+              <a:t>15/4/2019</a:t>
             </a:fld>
             <a:endParaRPr lang="en-SG"/>
           </a:p>
@@ -2934,7 +2930,7 @@
           <a:p>
             <a:fld id="{03EC4E3E-8101-482F-A883-8B55DAFF7C07}" type="datetimeFigureOut">
               <a:rPr lang="en-SG" smtClean="0"/>
-              <a:t>6/7/2018</a:t>
+              <a:t>15/4/2019</a:t>
             </a:fld>
             <a:endParaRPr lang="en-SG"/>
           </a:p>
@@ -3410,7 +3406,7 @@
           <p:nvPr>
             <p:extLst>
               <p:ext uri="{D42A27DB-BD31-4B8C-83A1-F6EECF244321}">
-                <p14:modId xmlns:p14="http://schemas.microsoft.com/office/powerpoint/2010/main" val="770650361"/>
+                <p14:modId xmlns:p14="http://schemas.microsoft.com/office/powerpoint/2010/main" val="2358695070"/>
               </p:ext>
             </p:extLst>
           </p:nvPr>
@@ -3440,13 +3436,14 @@
                     <a:bodyPr/>
                     <a:lstStyle/>
                     <a:p>
+                      <a:pPr algn="ctr"/>
                       <a:r>
                         <a:rPr lang="en-SG" u="sng" dirty="0"/>
-                        <a:t>ab0:</a:t>
+                        <a:t>e0:</a:t>
                       </a:r>
                       <a:r>
                         <a:rPr lang="en-SG" sz="1800" u="sng" dirty="0"/>
-                        <a:t>AddressBook</a:t>
+                        <a:t>EPiggy</a:t>
                       </a:r>
                       <a:endParaRPr lang="en-SG" sz="1600" u="sng" dirty="0"/>
                     </a:p>
@@ -3472,7 +3469,7 @@
         <p:spPr>
           <a:xfrm>
             <a:off x="4397701" y="2244365"/>
-            <a:ext cx="1672046" cy="1402081"/>
+            <a:ext cx="1292886" cy="1402081"/>
           </a:xfrm>
           <a:prstGeom prst="downArrow">
             <a:avLst/>
@@ -3501,7 +3498,7 @@
             <a:pPr algn="ctr"/>
             <a:r>
               <a:rPr lang="en-SG" dirty="0"/>
-              <a:t>delete 5</a:t>
+              <a:t>de 5</a:t>
             </a:r>
             <a:endParaRPr lang="en-US" dirty="0"/>
           </a:p>
@@ -3658,7 +3655,7 @@
           <p:nvPr>
             <p:extLst>
               <p:ext uri="{D42A27DB-BD31-4B8C-83A1-F6EECF244321}">
-                <p14:modId xmlns:p14="http://schemas.microsoft.com/office/powerpoint/2010/main" val="2370624015"/>
+                <p14:modId xmlns:p14="http://schemas.microsoft.com/office/powerpoint/2010/main" val="2703902877"/>
               </p:ext>
             </p:extLst>
           </p:nvPr>
@@ -3688,13 +3685,14 @@
                     <a:bodyPr/>
                     <a:lstStyle/>
                     <a:p>
+                      <a:pPr algn="ctr"/>
                       <a:r>
                         <a:rPr lang="en-SG" u="sng" dirty="0"/>
-                        <a:t>ab1:</a:t>
+                        <a:t>e1:</a:t>
                       </a:r>
                       <a:r>
                         <a:rPr lang="en-SG" sz="1800" u="sng" dirty="0"/>
-                        <a:t>AddressBook</a:t>
+                        <a:t>EPiggy</a:t>
                       </a:r>
                       <a:endParaRPr lang="en-SG" sz="1600" u="sng" dirty="0"/>
                     </a:p>
@@ -3726,7 +3724,7 @@
           <p:nvPr>
             <p:extLst>
               <p:ext uri="{D42A27DB-BD31-4B8C-83A1-F6EECF244321}">
-                <p14:modId xmlns:p14="http://schemas.microsoft.com/office/powerpoint/2010/main" val="2523374166"/>
+                <p14:modId xmlns:p14="http://schemas.microsoft.com/office/powerpoint/2010/main" val="3017206761"/>
               </p:ext>
             </p:extLst>
           </p:nvPr>
@@ -3756,13 +3754,14 @@
                     <a:bodyPr/>
                     <a:lstStyle/>
                     <a:p>
+                      <a:pPr algn="ctr"/>
                       <a:r>
                         <a:rPr lang="en-SG" u="sng" dirty="0"/>
-                        <a:t>ab0:</a:t>
+                        <a:t>e0:</a:t>
                       </a:r>
                       <a:r>
                         <a:rPr lang="en-SG" sz="1800" u="sng" dirty="0"/>
-                        <a:t>AddressBook</a:t>
+                        <a:t>EPiggy</a:t>
                       </a:r>
                       <a:endParaRPr lang="en-SG" sz="1600" u="sng" dirty="0"/>
                     </a:p>

</xml_diff>